<commit_message>
fix an unknown bug that makes server crash
</commit_message>
<xml_diff>
--- a/docs/ReportSlides.pptx
+++ b/docs/ReportSlides.pptx
@@ -3861,11 +3861,63 @@
           <a:p>
             <a:r>
               <a:rPr lang="en-US" b="0"/>
-              <a:t>PROJECT</a:t>
-            </a:r>
-            <a:r>
-              <a:rPr lang="en-US"/>
-              <a:t> SUMMARY</a:t>
+              <a:t>OUTLINE</a:t>
+            </a:r>
+            <a:endParaRPr lang="en-US"/>
+          </a:p>
+        </p:txBody>
+      </p:sp>
+      <p:sp>
+        <p:nvSpPr>
+          <p:cNvPr id="3" name="Rectangle 1">
+            <a:extLst>
+              <a:ext uri="{FF2B5EF4-FFF2-40B4-BE49-F238E27FC236}">
+                <a16:creationId xmlns:a16="http://schemas.microsoft.com/office/drawing/2014/main" id="{FCF1021D-DBAF-4FC7-9162-2B81F12084A7}"/>
+              </a:ext>
+            </a:extLst>
+          </p:cNvPr>
+          <p:cNvSpPr txBox="1">
+            <a:spLocks/>
+          </p:cNvSpPr>
+          <p:nvPr/>
+        </p:nvSpPr>
+        <p:spPr>
+          <a:xfrm>
+            <a:off x="762000" y="1600200"/>
+            <a:ext cx="7126357" cy="799306"/>
+          </a:xfrm>
+          <a:prstGeom prst="rect">
+            <a:avLst/>
+          </a:prstGeom>
+        </p:spPr>
+        <p:txBody>
+          <a:bodyPr vert="horz" lIns="0" rIns="0" anchor="ctr">
+            <a:noAutofit/>
+          </a:bodyPr>
+          <a:lstStyle>
+            <a:lvl1pPr marL="182880" algn="l" rtl="0" eaLnBrk="1" latinLnBrk="0" hangingPunct="1">
+              <a:spcBef>
+                <a:spcPct val="0"/>
+              </a:spcBef>
+              <a:buNone/>
+              <a:defRPr sz="4000" b="1" kern="1200">
+                <a:ln w="6350">
+                  <a:noFill/>
+                </a:ln>
+                <a:solidFill>
+                  <a:schemeClr val="accent1"/>
+                </a:solidFill>
+                <a:effectLst/>
+                <a:latin typeface="+mj-lt"/>
+                <a:ea typeface="+mj-ea"/>
+                <a:cs typeface="+mj-cs"/>
+              </a:defRPr>
+            </a:lvl1pPr>
+          </a:lstStyle>
+          <a:p>
+            <a:r>
+              <a:rPr lang="en-US"/>
+              <a:t>1.Analysis and Design</a:t>
             </a:r>
           </a:p>
         </p:txBody>

</xml_diff>